<commit_message>
updating ER diagrams with user and favorites tables
</commit_message>
<xml_diff>
--- a/Documentation/ER_diagrams.pptx
+++ b/Documentation/ER_diagrams.pptx
@@ -5,11 +5,12 @@
     <p:sldMasterId id="2147483648" r:id="rId1"/>
   </p:sldMasterIdLst>
   <p:sldIdLst>
-    <p:sldId id="257" r:id="rId2"/>
-    <p:sldId id="256" r:id="rId3"/>
-    <p:sldId id="259" r:id="rId4"/>
-    <p:sldId id="261" r:id="rId5"/>
-    <p:sldId id="262" r:id="rId6"/>
+    <p:sldId id="264" r:id="rId2"/>
+    <p:sldId id="257" r:id="rId3"/>
+    <p:sldId id="256" r:id="rId4"/>
+    <p:sldId id="259" r:id="rId5"/>
+    <p:sldId id="261" r:id="rId6"/>
+    <p:sldId id="262" r:id="rId7"/>
   </p:sldIdLst>
   <p:sldSz cx="12192000" cy="6858000"/>
   <p:notesSz cx="6858000" cy="9144000"/>
@@ -3332,6 +3333,92 @@
       </p:grpSpPr>
       <p:sp>
         <p:nvSpPr>
+          <p:cNvPr id="2" name="Title 1">
+            <a:extLst>
+              <a:ext uri="{FF2B5EF4-FFF2-40B4-BE49-F238E27FC236}">
+                <a16:creationId xmlns:a16="http://schemas.microsoft.com/office/drawing/2014/main" id="{6C88AFDE-0038-429F-9AA9-52E487DF3EDA}"/>
+              </a:ext>
+            </a:extLst>
+          </p:cNvPr>
+          <p:cNvSpPr>
+            <a:spLocks noGrp="1"/>
+          </p:cNvSpPr>
+          <p:nvPr>
+            <p:ph type="ctrTitle"/>
+          </p:nvPr>
+        </p:nvSpPr>
+        <p:spPr/>
+        <p:txBody>
+          <a:bodyPr/>
+          <a:lstStyle/>
+          <a:p>
+            <a:r>
+              <a:rPr lang="en-US" dirty="0"/>
+              <a:t>ER Diagrams for CSI 5302 Group Project</a:t>
+            </a:r>
+          </a:p>
+        </p:txBody>
+      </p:sp>
+      <p:sp>
+        <p:nvSpPr>
+          <p:cNvPr id="3" name="Subtitle 2">
+            <a:extLst>
+              <a:ext uri="{FF2B5EF4-FFF2-40B4-BE49-F238E27FC236}">
+                <a16:creationId xmlns:a16="http://schemas.microsoft.com/office/drawing/2014/main" id="{219552D9-754F-4CE7-BF7D-F51DC877FD5B}"/>
+              </a:ext>
+            </a:extLst>
+          </p:cNvPr>
+          <p:cNvSpPr>
+            <a:spLocks noGrp="1"/>
+          </p:cNvSpPr>
+          <p:nvPr>
+            <p:ph type="subTitle" idx="1"/>
+          </p:nvPr>
+        </p:nvSpPr>
+        <p:spPr/>
+        <p:txBody>
+          <a:bodyPr/>
+          <a:lstStyle/>
+          <a:p>
+            <a:r>
+              <a:rPr lang="en-US" dirty="0"/>
+              <a:t>Team: Matthew Hayes, Sarah Smallwood, Joshua Wellman</a:t>
+            </a:r>
+          </a:p>
+        </p:txBody>
+      </p:sp>
+    </p:spTree>
+    <p:extLst>
+      <p:ext uri="{BB962C8B-B14F-4D97-AF65-F5344CB8AC3E}">
+        <p14:creationId xmlns:p14="http://schemas.microsoft.com/office/powerpoint/2010/main" val="1939031240"/>
+      </p:ext>
+    </p:extLst>
+  </p:cSld>
+  <p:clrMapOvr>
+    <a:masterClrMapping/>
+  </p:clrMapOvr>
+</p:sld>
+</file>
+
+<file path=ppt/slides/slide2.xml><?xml version="1.0" encoding="utf-8"?>
+<p:sld xmlns:a="http://schemas.openxmlformats.org/drawingml/2006/main" xmlns:r="http://schemas.openxmlformats.org/officeDocument/2006/relationships" xmlns:p="http://schemas.openxmlformats.org/presentationml/2006/main">
+  <p:cSld>
+    <p:spTree>
+      <p:nvGrpSpPr>
+        <p:cNvPr id="1" name=""/>
+        <p:cNvGrpSpPr/>
+        <p:nvPr/>
+      </p:nvGrpSpPr>
+      <p:grpSpPr>
+        <a:xfrm>
+          <a:off x="0" y="0"/>
+          <a:ext cx="0" cy="0"/>
+          <a:chOff x="0" y="0"/>
+          <a:chExt cx="0" cy="0"/>
+        </a:xfrm>
+      </p:grpSpPr>
+      <p:sp>
+        <p:nvSpPr>
           <p:cNvPr id="5" name="Rectangle: Rounded Corners 4">
             <a:extLst>
               <a:ext uri="{FF2B5EF4-FFF2-40B4-BE49-F238E27FC236}">
@@ -3344,7 +3431,7 @@
         </p:nvSpPr>
         <p:spPr>
           <a:xfrm>
-            <a:off x="1936888" y="3071761"/>
+            <a:off x="3972718" y="3105169"/>
             <a:ext cx="1811045" cy="1136342"/>
           </a:xfrm>
           <a:prstGeom prst="roundRect">
@@ -3396,7 +3483,7 @@
         </p:nvSpPr>
         <p:spPr>
           <a:xfrm>
-            <a:off x="1936889" y="3389593"/>
+            <a:off x="3972719" y="3423001"/>
             <a:ext cx="1811044" cy="369332"/>
           </a:xfrm>
           <a:prstGeom prst="rect">
@@ -3432,7 +3519,7 @@
         </p:nvSpPr>
         <p:spPr>
           <a:xfrm>
-            <a:off x="4025363" y="3096915"/>
+            <a:off x="6061193" y="3130323"/>
             <a:ext cx="1774054" cy="1111188"/>
           </a:xfrm>
           <a:prstGeom prst="roundRect">
@@ -3484,7 +3571,7 @@
         </p:nvSpPr>
         <p:spPr>
           <a:xfrm>
-            <a:off x="4025363" y="3389593"/>
+            <a:off x="6061193" y="3423001"/>
             <a:ext cx="1774054" cy="369332"/>
           </a:xfrm>
           <a:prstGeom prst="rect">
@@ -3520,7 +3607,7 @@
         </p:nvSpPr>
         <p:spPr>
           <a:xfrm>
-            <a:off x="6039853" y="3096915"/>
+            <a:off x="8075683" y="3130323"/>
             <a:ext cx="1774054" cy="1111188"/>
           </a:xfrm>
           <a:prstGeom prst="roundRect">
@@ -3572,7 +3659,7 @@
         </p:nvSpPr>
         <p:spPr>
           <a:xfrm>
-            <a:off x="6039853" y="3389593"/>
+            <a:off x="8075683" y="3423001"/>
             <a:ext cx="1774054" cy="369332"/>
           </a:xfrm>
           <a:prstGeom prst="rect">
@@ -3696,7 +3783,7 @@
         </p:nvSpPr>
         <p:spPr>
           <a:xfrm>
-            <a:off x="5043815" y="914864"/>
+            <a:off x="7079645" y="948272"/>
             <a:ext cx="1811045" cy="1136342"/>
           </a:xfrm>
           <a:prstGeom prst="roundRect">
@@ -3748,7 +3835,7 @@
         </p:nvSpPr>
         <p:spPr>
           <a:xfrm>
-            <a:off x="5043815" y="1207542"/>
+            <a:off x="7079645" y="1240950"/>
             <a:ext cx="1811045" cy="369332"/>
           </a:xfrm>
           <a:prstGeom prst="rect">
@@ -3784,7 +3871,7 @@
         </p:nvSpPr>
         <p:spPr>
           <a:xfrm>
-            <a:off x="3451233" y="5005633"/>
+            <a:off x="5487064" y="4903996"/>
             <a:ext cx="4996207" cy="369332"/>
           </a:xfrm>
           <a:prstGeom prst="rect">
@@ -3819,7 +3906,7 @@
         </p:nvSpPr>
         <p:spPr>
           <a:xfrm>
-            <a:off x="8054343" y="3096824"/>
+            <a:off x="10090173" y="3130232"/>
             <a:ext cx="1774054" cy="1111188"/>
           </a:xfrm>
           <a:prstGeom prst="roundRect">
@@ -3871,7 +3958,7 @@
         </p:nvSpPr>
         <p:spPr>
           <a:xfrm>
-            <a:off x="8054343" y="3389502"/>
+            <a:off x="10090173" y="3422910"/>
             <a:ext cx="1774054" cy="369332"/>
           </a:xfrm>
           <a:prstGeom prst="rect">
@@ -3910,7 +3997,7 @@
         </p:nvCxnSpPr>
         <p:spPr>
           <a:xfrm rot="5400000" flipH="1" flipV="1">
-            <a:off x="3885597" y="1008021"/>
+            <a:off x="5921427" y="1041429"/>
             <a:ext cx="1020555" cy="3106927"/>
           </a:xfrm>
           <a:prstGeom prst="bentConnector3">
@@ -3955,7 +4042,7 @@
         </p:nvCxnSpPr>
         <p:spPr>
           <a:xfrm rot="5400000" flipH="1" flipV="1">
-            <a:off x="4908010" y="2055587"/>
+            <a:off x="6943840" y="2088995"/>
             <a:ext cx="1045709" cy="1036948"/>
           </a:xfrm>
           <a:prstGeom prst="bentConnector3">
@@ -4002,7 +4089,7 @@
         </p:nvCxnSpPr>
         <p:spPr>
           <a:xfrm rot="16200000" flipV="1">
-            <a:off x="5915255" y="2085290"/>
+            <a:off x="7951085" y="2118698"/>
             <a:ext cx="1045709" cy="977542"/>
           </a:xfrm>
           <a:prstGeom prst="bentConnector3">
@@ -4050,7 +4137,7 @@
         </p:nvCxnSpPr>
         <p:spPr>
           <a:xfrm rot="16200000" flipV="1">
-            <a:off x="6922545" y="1077999"/>
+            <a:off x="8958375" y="1111407"/>
             <a:ext cx="1045618" cy="2992032"/>
           </a:xfrm>
           <a:prstGeom prst="bentConnector3">
@@ -4094,8 +4181,8 @@
         </p:nvSpPr>
         <p:spPr>
           <a:xfrm>
-            <a:off x="-16290" y="6141883"/>
-            <a:ext cx="12208289" cy="584775"/>
+            <a:off x="-16289" y="6003031"/>
+            <a:ext cx="12208289" cy="830997"/>
           </a:xfrm>
           <a:prstGeom prst="rect">
             <a:avLst/>
@@ -4110,7 +4197,7 @@
           <a:p>
             <a:r>
               <a:rPr lang="en-US" sz="1600" dirty="0"/>
-              <a:t>In the </a:t>
+              <a:t>For this project, we will have users that will access our web application and favorite people, specifically pitchers, within the </a:t>
             </a:r>
             <a:r>
               <a:rPr lang="en-US" sz="1600" dirty="0" err="1"/>
@@ -4118,7 +4205,23 @@
             </a:r>
             <a:r>
               <a:rPr lang="en-US" sz="1600" dirty="0"/>
-              <a:t> database, all people are categorized into pitchers, batters, fielders, and managers. Individual players can be sorted into more than 1 category.</a:t>
+              <a:t> database. Both users and favorites are new entities we add to our existing </a:t>
+            </a:r>
+            <a:r>
+              <a:rPr lang="en-US" sz="1600" dirty="0" err="1"/>
+              <a:t>Lahman</a:t>
+            </a:r>
+            <a:r>
+              <a:rPr lang="en-US" sz="1600" dirty="0"/>
+              <a:t> database. Inherently in the </a:t>
+            </a:r>
+            <a:r>
+              <a:rPr lang="en-US" sz="1600" dirty="0" err="1"/>
+              <a:t>Lahman</a:t>
+            </a:r>
+            <a:r>
+              <a:rPr lang="en-US" sz="1600" dirty="0"/>
+              <a:t> database, all people are categorized into pitchers, batters, fielders, and managers. Individual players can be sorted into more than 1 category. </a:t>
             </a:r>
           </a:p>
         </p:txBody>
@@ -4137,7 +4240,7 @@
         </p:nvSpPr>
         <p:spPr>
           <a:xfrm>
-            <a:off x="5661241" y="2161224"/>
+            <a:off x="7697071" y="2194632"/>
             <a:ext cx="666709" cy="369332"/>
           </a:xfrm>
           <a:prstGeom prst="rect">
@@ -4158,6 +4261,964 @@
           </a:p>
         </p:txBody>
       </p:sp>
+      <p:sp>
+        <p:nvSpPr>
+          <p:cNvPr id="21" name="Rectangle: Rounded Corners 20">
+            <a:extLst>
+              <a:ext uri="{FF2B5EF4-FFF2-40B4-BE49-F238E27FC236}">
+                <a16:creationId xmlns:a16="http://schemas.microsoft.com/office/drawing/2014/main" id="{625E6055-7C40-48E3-95B8-7D28C46E8BE0}"/>
+              </a:ext>
+            </a:extLst>
+          </p:cNvPr>
+          <p:cNvSpPr/>
+          <p:nvPr/>
+        </p:nvSpPr>
+        <p:spPr>
+          <a:xfrm>
+            <a:off x="426093" y="905167"/>
+            <a:ext cx="1811045" cy="1136342"/>
+          </a:xfrm>
+          <a:prstGeom prst="roundRect">
+            <a:avLst/>
+          </a:prstGeom>
+          <a:noFill/>
+          <a:ln>
+            <a:solidFill>
+              <a:schemeClr val="tx1"/>
+            </a:solidFill>
+          </a:ln>
+        </p:spPr>
+        <p:style>
+          <a:lnRef idx="2">
+            <a:schemeClr val="accent1">
+              <a:shade val="50000"/>
+            </a:schemeClr>
+          </a:lnRef>
+          <a:fillRef idx="1">
+            <a:schemeClr val="accent1"/>
+          </a:fillRef>
+          <a:effectRef idx="0">
+            <a:schemeClr val="accent1"/>
+          </a:effectRef>
+          <a:fontRef idx="minor">
+            <a:schemeClr val="lt1"/>
+          </a:fontRef>
+        </p:style>
+        <p:txBody>
+          <a:bodyPr rtlCol="0" anchor="ctr"/>
+          <a:lstStyle/>
+          <a:p>
+            <a:pPr algn="ctr"/>
+            <a:endParaRPr lang="en-US"/>
+          </a:p>
+        </p:txBody>
+      </p:sp>
+      <p:sp>
+        <p:nvSpPr>
+          <p:cNvPr id="22" name="TextBox 21">
+            <a:extLst>
+              <a:ext uri="{FF2B5EF4-FFF2-40B4-BE49-F238E27FC236}">
+                <a16:creationId xmlns:a16="http://schemas.microsoft.com/office/drawing/2014/main" id="{60BE74FF-C0AB-4E8F-A0F5-5EE2A67408B5}"/>
+              </a:ext>
+            </a:extLst>
+          </p:cNvPr>
+          <p:cNvSpPr txBox="1"/>
+          <p:nvPr/>
+        </p:nvSpPr>
+        <p:spPr>
+          <a:xfrm>
+            <a:off x="426094" y="1222999"/>
+            <a:ext cx="1811044" cy="369332"/>
+          </a:xfrm>
+          <a:prstGeom prst="rect">
+            <a:avLst/>
+          </a:prstGeom>
+          <a:noFill/>
+        </p:spPr>
+        <p:txBody>
+          <a:bodyPr wrap="square" rtlCol="0">
+            <a:spAutoFit/>
+          </a:bodyPr>
+          <a:lstStyle/>
+          <a:p>
+            <a:pPr algn="ctr"/>
+            <a:r>
+              <a:rPr lang="en-US" dirty="0"/>
+              <a:t>users</a:t>
+            </a:r>
+          </a:p>
+        </p:txBody>
+      </p:sp>
+      <p:sp>
+        <p:nvSpPr>
+          <p:cNvPr id="2" name="Diamond 1">
+            <a:extLst>
+              <a:ext uri="{FF2B5EF4-FFF2-40B4-BE49-F238E27FC236}">
+                <a16:creationId xmlns:a16="http://schemas.microsoft.com/office/drawing/2014/main" id="{C97C58EC-E39F-448C-91C6-9AFB83FBFAC8}"/>
+              </a:ext>
+            </a:extLst>
+          </p:cNvPr>
+          <p:cNvSpPr/>
+          <p:nvPr/>
+        </p:nvSpPr>
+        <p:spPr>
+          <a:xfrm>
+            <a:off x="3930056" y="758366"/>
+            <a:ext cx="1456671" cy="1298598"/>
+          </a:xfrm>
+          <a:prstGeom prst="diamond">
+            <a:avLst/>
+          </a:prstGeom>
+          <a:noFill/>
+          <a:ln>
+            <a:solidFill>
+              <a:schemeClr val="tx1"/>
+            </a:solidFill>
+          </a:ln>
+        </p:spPr>
+        <p:style>
+          <a:lnRef idx="2">
+            <a:schemeClr val="accent1">
+              <a:shade val="50000"/>
+            </a:schemeClr>
+          </a:lnRef>
+          <a:fillRef idx="1">
+            <a:schemeClr val="accent1"/>
+          </a:fillRef>
+          <a:effectRef idx="0">
+            <a:schemeClr val="accent1"/>
+          </a:effectRef>
+          <a:fontRef idx="minor">
+            <a:schemeClr val="lt1"/>
+          </a:fontRef>
+        </p:style>
+        <p:txBody>
+          <a:bodyPr rtlCol="0" anchor="ctr"/>
+          <a:lstStyle/>
+          <a:p>
+            <a:pPr algn="ctr"/>
+            <a:endParaRPr lang="en-US"/>
+          </a:p>
+        </p:txBody>
+      </p:sp>
+      <p:cxnSp>
+        <p:nvCxnSpPr>
+          <p:cNvPr id="4" name="Straight Connector 3">
+            <a:extLst>
+              <a:ext uri="{FF2B5EF4-FFF2-40B4-BE49-F238E27FC236}">
+                <a16:creationId xmlns:a16="http://schemas.microsoft.com/office/drawing/2014/main" id="{60988137-5093-428C-B2EE-3D9AF2941B03}"/>
+              </a:ext>
+            </a:extLst>
+          </p:cNvPr>
+          <p:cNvCxnSpPr>
+            <a:stCxn id="22" idx="3"/>
+            <a:endCxn id="2" idx="1"/>
+          </p:cNvCxnSpPr>
+          <p:nvPr/>
+        </p:nvCxnSpPr>
+        <p:spPr>
+          <a:xfrm>
+            <a:off x="2237138" y="1407665"/>
+            <a:ext cx="1692918" cy="0"/>
+          </a:xfrm>
+          <a:prstGeom prst="line">
+            <a:avLst/>
+          </a:prstGeom>
+        </p:spPr>
+        <p:style>
+          <a:lnRef idx="1">
+            <a:schemeClr val="dk1"/>
+          </a:lnRef>
+          <a:fillRef idx="0">
+            <a:schemeClr val="dk1"/>
+          </a:fillRef>
+          <a:effectRef idx="0">
+            <a:schemeClr val="dk1"/>
+          </a:effectRef>
+          <a:fontRef idx="minor">
+            <a:schemeClr val="tx1"/>
+          </a:fontRef>
+        </p:style>
+      </p:cxnSp>
+      <p:cxnSp>
+        <p:nvCxnSpPr>
+          <p:cNvPr id="14" name="Straight Connector 13">
+            <a:extLst>
+              <a:ext uri="{FF2B5EF4-FFF2-40B4-BE49-F238E27FC236}">
+                <a16:creationId xmlns:a16="http://schemas.microsoft.com/office/drawing/2014/main" id="{C6C1B1BD-F75B-444A-B4DB-296935858A13}"/>
+              </a:ext>
+            </a:extLst>
+          </p:cNvPr>
+          <p:cNvCxnSpPr>
+            <a:stCxn id="2" idx="3"/>
+            <a:endCxn id="16" idx="1"/>
+          </p:cNvCxnSpPr>
+          <p:nvPr/>
+        </p:nvCxnSpPr>
+        <p:spPr>
+          <a:xfrm>
+            <a:off x="5386727" y="1407665"/>
+            <a:ext cx="1692918" cy="17951"/>
+          </a:xfrm>
+          <a:prstGeom prst="line">
+            <a:avLst/>
+          </a:prstGeom>
+        </p:spPr>
+        <p:style>
+          <a:lnRef idx="1">
+            <a:schemeClr val="dk1"/>
+          </a:lnRef>
+          <a:fillRef idx="0">
+            <a:schemeClr val="dk1"/>
+          </a:fillRef>
+          <a:effectRef idx="0">
+            <a:schemeClr val="dk1"/>
+          </a:effectRef>
+          <a:fontRef idx="minor">
+            <a:schemeClr val="tx1"/>
+          </a:fontRef>
+        </p:style>
+      </p:cxnSp>
+      <p:sp>
+        <p:nvSpPr>
+          <p:cNvPr id="36" name="TextBox 35">
+            <a:extLst>
+              <a:ext uri="{FF2B5EF4-FFF2-40B4-BE49-F238E27FC236}">
+                <a16:creationId xmlns:a16="http://schemas.microsoft.com/office/drawing/2014/main" id="{D96ABC66-1ACE-40CA-B7EC-56EB980DFD54}"/>
+              </a:ext>
+            </a:extLst>
+          </p:cNvPr>
+          <p:cNvSpPr txBox="1"/>
+          <p:nvPr/>
+        </p:nvSpPr>
+        <p:spPr>
+          <a:xfrm>
+            <a:off x="3752869" y="1191330"/>
+            <a:ext cx="1811044" cy="369332"/>
+          </a:xfrm>
+          <a:prstGeom prst="rect">
+            <a:avLst/>
+          </a:prstGeom>
+          <a:noFill/>
+        </p:spPr>
+        <p:txBody>
+          <a:bodyPr wrap="square" rtlCol="0">
+            <a:spAutoFit/>
+          </a:bodyPr>
+          <a:lstStyle/>
+          <a:p>
+            <a:pPr algn="ctr"/>
+            <a:r>
+              <a:rPr lang="en-US" dirty="0"/>
+              <a:t>favorite</a:t>
+            </a:r>
+          </a:p>
+        </p:txBody>
+      </p:sp>
+      <p:graphicFrame>
+        <p:nvGraphicFramePr>
+          <p:cNvPr id="41" name="Table 40">
+            <a:extLst>
+              <a:ext uri="{FF2B5EF4-FFF2-40B4-BE49-F238E27FC236}">
+                <a16:creationId xmlns:a16="http://schemas.microsoft.com/office/drawing/2014/main" id="{0326C29A-1EB3-45CD-AFA4-43653D0EEDA5}"/>
+              </a:ext>
+            </a:extLst>
+          </p:cNvPr>
+          <p:cNvGraphicFramePr>
+            <a:graphicFrameLocks noGrp="1"/>
+          </p:cNvGraphicFramePr>
+          <p:nvPr>
+            <p:extLst>
+              <p:ext uri="{D42A27DB-BD31-4B8C-83A1-F6EECF244321}">
+                <p14:modId xmlns:p14="http://schemas.microsoft.com/office/powerpoint/2010/main" val="1326102555"/>
+              </p:ext>
+            </p:extLst>
+          </p:nvPr>
+        </p:nvGraphicFramePr>
+        <p:xfrm>
+          <a:off x="635912" y="2216100"/>
+          <a:ext cx="1329329" cy="748284"/>
+        </p:xfrm>
+        <a:graphic>
+          <a:graphicData uri="http://schemas.openxmlformats.org/drawingml/2006/table">
+            <a:tbl>
+              <a:tblPr firstRow="1" firstCol="1" bandRow="1">
+                <a:tableStyleId>{5C22544A-7EE6-4342-B048-85BDC9FD1C3A}</a:tableStyleId>
+              </a:tblPr>
+              <a:tblGrid>
+                <a:gridCol w="1329329">
+                  <a:extLst>
+                    <a:ext uri="{9D8B030D-6E8A-4147-A177-3AD203B41FA5}">
+                      <a16:colId xmlns:a16="http://schemas.microsoft.com/office/drawing/2014/main" val="367853106"/>
+                    </a:ext>
+                  </a:extLst>
+                </a:gridCol>
+              </a:tblGrid>
+              <a:tr h="181306">
+                <a:tc>
+                  <a:txBody>
+                    <a:bodyPr/>
+                    <a:lstStyle/>
+                    <a:p>
+                      <a:pPr marL="0" marR="0" algn="ctr">
+                        <a:lnSpc>
+                          <a:spcPct val="107000"/>
+                        </a:lnSpc>
+                        <a:spcBef>
+                          <a:spcPts val="0"/>
+                        </a:spcBef>
+                        <a:spcAft>
+                          <a:spcPts val="0"/>
+                        </a:spcAft>
+                      </a:pPr>
+                      <a:r>
+                        <a:rPr lang="en-US" sz="1200" dirty="0">
+                          <a:solidFill>
+                            <a:schemeClr val="tx1"/>
+                          </a:solidFill>
+                          <a:effectLst/>
+                          <a:latin typeface="Calibri" panose="020F0502020204030204" pitchFamily="34" charset="0"/>
+                          <a:ea typeface="Calibri" panose="020F0502020204030204" pitchFamily="34" charset="0"/>
+                          <a:cs typeface="Times New Roman" panose="02020603050405020304" pitchFamily="18" charset="0"/>
+                        </a:rPr>
+                        <a:t>Users</a:t>
+                      </a:r>
+                      <a:endParaRPr lang="en-US" sz="1100" dirty="0">
+                        <a:solidFill>
+                          <a:schemeClr val="tx1"/>
+                        </a:solidFill>
+                        <a:effectLst/>
+                        <a:latin typeface="Calibri" panose="020F0502020204030204" pitchFamily="34" charset="0"/>
+                        <a:ea typeface="Calibri" panose="020F0502020204030204" pitchFamily="34" charset="0"/>
+                        <a:cs typeface="Times New Roman" panose="02020603050405020304" pitchFamily="18" charset="0"/>
+                      </a:endParaRPr>
+                    </a:p>
+                  </a:txBody>
+                  <a:tcPr marL="66466" marR="66466" marT="0" marB="0">
+                    <a:lnL w="12700" cap="flat" cmpd="sng" algn="ctr">
+                      <a:solidFill>
+                        <a:schemeClr val="tx1"/>
+                      </a:solidFill>
+                      <a:prstDash val="solid"/>
+                      <a:round/>
+                      <a:headEnd type="none" w="med" len="med"/>
+                      <a:tailEnd type="none" w="med" len="med"/>
+                    </a:lnL>
+                    <a:lnR w="12700" cap="flat" cmpd="sng" algn="ctr">
+                      <a:solidFill>
+                        <a:schemeClr val="tx1"/>
+                      </a:solidFill>
+                      <a:prstDash val="solid"/>
+                      <a:round/>
+                      <a:headEnd type="none" w="med" len="med"/>
+                      <a:tailEnd type="none" w="med" len="med"/>
+                    </a:lnR>
+                    <a:lnT w="12700" cap="flat" cmpd="sng" algn="ctr">
+                      <a:solidFill>
+                        <a:schemeClr val="tx1"/>
+                      </a:solidFill>
+                      <a:prstDash val="solid"/>
+                      <a:round/>
+                      <a:headEnd type="none" w="med" len="med"/>
+                      <a:tailEnd type="none" w="med" len="med"/>
+                    </a:lnT>
+                    <a:lnB w="12700" cap="flat" cmpd="sng" algn="ctr">
+                      <a:solidFill>
+                        <a:schemeClr val="tx1"/>
+                      </a:solidFill>
+                      <a:prstDash val="solid"/>
+                      <a:round/>
+                      <a:headEnd type="none" w="med" len="med"/>
+                      <a:tailEnd type="none" w="med" len="med"/>
+                    </a:lnB>
+                    <a:solidFill>
+                      <a:schemeClr val="bg1">
+                        <a:lumMod val="85000"/>
+                      </a:schemeClr>
+                    </a:solidFill>
+                  </a:tcPr>
+                </a:tc>
+                <a:extLst>
+                  <a:ext uri="{0D108BD9-81ED-4DB2-BD59-A6C34878D82A}">
+                    <a16:rowId xmlns:a16="http://schemas.microsoft.com/office/drawing/2014/main" val="1416855876"/>
+                  </a:ext>
+                </a:extLst>
+              </a:tr>
+              <a:tr h="181306">
+                <a:tc>
+                  <a:txBody>
+                    <a:bodyPr/>
+                    <a:lstStyle/>
+                    <a:p>
+                      <a:pPr marL="40005" marR="0" algn="ctr">
+                        <a:lnSpc>
+                          <a:spcPct val="107000"/>
+                        </a:lnSpc>
+                        <a:spcBef>
+                          <a:spcPts val="0"/>
+                        </a:spcBef>
+                        <a:spcAft>
+                          <a:spcPts val="0"/>
+                        </a:spcAft>
+                      </a:pPr>
+                      <a:r>
+                        <a:rPr lang="en-US" sz="1200" b="0" u="sng" dirty="0">
+                          <a:solidFill>
+                            <a:schemeClr val="tx1"/>
+                          </a:solidFill>
+                          <a:effectLst/>
+                          <a:latin typeface="Calibri" panose="020F0502020204030204" pitchFamily="34" charset="0"/>
+                          <a:ea typeface="Calibri" panose="020F0502020204030204" pitchFamily="34" charset="0"/>
+                          <a:cs typeface="Times New Roman" panose="02020603050405020304" pitchFamily="18" charset="0"/>
+                        </a:rPr>
+                        <a:t>ID</a:t>
+                      </a:r>
+                      <a:endParaRPr lang="en-US" sz="1100" b="0" u="sng" dirty="0">
+                        <a:solidFill>
+                          <a:schemeClr val="tx1"/>
+                        </a:solidFill>
+                        <a:effectLst/>
+                        <a:latin typeface="Calibri" panose="020F0502020204030204" pitchFamily="34" charset="0"/>
+                        <a:ea typeface="Calibri" panose="020F0502020204030204" pitchFamily="34" charset="0"/>
+                        <a:cs typeface="Times New Roman" panose="02020603050405020304" pitchFamily="18" charset="0"/>
+                      </a:endParaRPr>
+                    </a:p>
+                  </a:txBody>
+                  <a:tcPr marL="66466" marR="66466" marT="0" marB="0">
+                    <a:lnL w="12700" cap="flat" cmpd="sng" algn="ctr">
+                      <a:solidFill>
+                        <a:schemeClr val="tx1"/>
+                      </a:solidFill>
+                      <a:prstDash val="solid"/>
+                      <a:round/>
+                      <a:headEnd type="none" w="med" len="med"/>
+                      <a:tailEnd type="none" w="med" len="med"/>
+                    </a:lnL>
+                    <a:lnR w="12700" cap="flat" cmpd="sng" algn="ctr">
+                      <a:solidFill>
+                        <a:schemeClr val="tx1"/>
+                      </a:solidFill>
+                      <a:prstDash val="solid"/>
+                      <a:round/>
+                      <a:headEnd type="none" w="med" len="med"/>
+                      <a:tailEnd type="none" w="med" len="med"/>
+                    </a:lnR>
+                    <a:lnT w="12700" cap="flat" cmpd="sng" algn="ctr">
+                      <a:solidFill>
+                        <a:schemeClr val="tx1"/>
+                      </a:solidFill>
+                      <a:prstDash val="solid"/>
+                      <a:round/>
+                      <a:headEnd type="none" w="med" len="med"/>
+                      <a:tailEnd type="none" w="med" len="med"/>
+                    </a:lnT>
+                    <a:lnB w="12700" cap="flat" cmpd="sng" algn="ctr">
+                      <a:solidFill>
+                        <a:schemeClr val="tx1"/>
+                      </a:solidFill>
+                      <a:prstDash val="solid"/>
+                      <a:round/>
+                      <a:headEnd type="none" w="med" len="med"/>
+                      <a:tailEnd type="none" w="med" len="med"/>
+                    </a:lnB>
+                    <a:solidFill>
+                      <a:schemeClr val="bg1">
+                        <a:lumMod val="85000"/>
+                      </a:schemeClr>
+                    </a:solidFill>
+                  </a:tcPr>
+                </a:tc>
+                <a:extLst>
+                  <a:ext uri="{0D108BD9-81ED-4DB2-BD59-A6C34878D82A}">
+                    <a16:rowId xmlns:a16="http://schemas.microsoft.com/office/drawing/2014/main" val="3461335968"/>
+                  </a:ext>
+                </a:extLst>
+              </a:tr>
+              <a:tr h="181306">
+                <a:tc>
+                  <a:txBody>
+                    <a:bodyPr/>
+                    <a:lstStyle/>
+                    <a:p>
+                      <a:pPr marL="0" marR="0" algn="ctr">
+                        <a:lnSpc>
+                          <a:spcPct val="107000"/>
+                        </a:lnSpc>
+                        <a:spcBef>
+                          <a:spcPts val="0"/>
+                        </a:spcBef>
+                        <a:spcAft>
+                          <a:spcPts val="0"/>
+                        </a:spcAft>
+                      </a:pPr>
+                      <a:r>
+                        <a:rPr lang="en-US" sz="1200" b="0" dirty="0">
+                          <a:solidFill>
+                            <a:schemeClr val="tx1"/>
+                          </a:solidFill>
+                          <a:effectLst/>
+                        </a:rPr>
+                        <a:t>username</a:t>
+                      </a:r>
+                      <a:endParaRPr lang="en-US" sz="1100" b="0" dirty="0">
+                        <a:solidFill>
+                          <a:schemeClr val="tx1"/>
+                        </a:solidFill>
+                        <a:effectLst/>
+                        <a:latin typeface="Calibri" panose="020F0502020204030204" pitchFamily="34" charset="0"/>
+                        <a:ea typeface="Calibri" panose="020F0502020204030204" pitchFamily="34" charset="0"/>
+                        <a:cs typeface="Times New Roman" panose="02020603050405020304" pitchFamily="18" charset="0"/>
+                      </a:endParaRPr>
+                    </a:p>
+                  </a:txBody>
+                  <a:tcPr marL="66466" marR="66466" marT="0" marB="0">
+                    <a:lnL w="12700" cap="flat" cmpd="sng" algn="ctr">
+                      <a:solidFill>
+                        <a:schemeClr val="tx1"/>
+                      </a:solidFill>
+                      <a:prstDash val="solid"/>
+                      <a:round/>
+                      <a:headEnd type="none" w="med" len="med"/>
+                      <a:tailEnd type="none" w="med" len="med"/>
+                    </a:lnL>
+                    <a:lnR w="12700" cap="flat" cmpd="sng" algn="ctr">
+                      <a:solidFill>
+                        <a:schemeClr val="tx1"/>
+                      </a:solidFill>
+                      <a:prstDash val="solid"/>
+                      <a:round/>
+                      <a:headEnd type="none" w="med" len="med"/>
+                      <a:tailEnd type="none" w="med" len="med"/>
+                    </a:lnR>
+                    <a:lnT w="12700" cap="flat" cmpd="sng" algn="ctr">
+                      <a:solidFill>
+                        <a:schemeClr val="tx1"/>
+                      </a:solidFill>
+                      <a:prstDash val="solid"/>
+                      <a:round/>
+                      <a:headEnd type="none" w="med" len="med"/>
+                      <a:tailEnd type="none" w="med" len="med"/>
+                    </a:lnT>
+                    <a:lnB w="12700" cap="flat" cmpd="sng" algn="ctr">
+                      <a:solidFill>
+                        <a:schemeClr val="tx1"/>
+                      </a:solidFill>
+                      <a:prstDash val="solid"/>
+                      <a:round/>
+                      <a:headEnd type="none" w="med" len="med"/>
+                      <a:tailEnd type="none" w="med" len="med"/>
+                    </a:lnB>
+                    <a:solidFill>
+                      <a:schemeClr val="bg1">
+                        <a:lumMod val="85000"/>
+                      </a:schemeClr>
+                    </a:solidFill>
+                  </a:tcPr>
+                </a:tc>
+                <a:extLst>
+                  <a:ext uri="{0D108BD9-81ED-4DB2-BD59-A6C34878D82A}">
+                    <a16:rowId xmlns:a16="http://schemas.microsoft.com/office/drawing/2014/main" val="269878394"/>
+                  </a:ext>
+                </a:extLst>
+              </a:tr>
+              <a:tr h="181306">
+                <a:tc>
+                  <a:txBody>
+                    <a:bodyPr/>
+                    <a:lstStyle/>
+                    <a:p>
+                      <a:pPr marL="0" marR="0" algn="ctr">
+                        <a:lnSpc>
+                          <a:spcPct val="107000"/>
+                        </a:lnSpc>
+                        <a:spcBef>
+                          <a:spcPts val="0"/>
+                        </a:spcBef>
+                        <a:spcAft>
+                          <a:spcPts val="0"/>
+                        </a:spcAft>
+                      </a:pPr>
+                      <a:r>
+                        <a:rPr lang="en-US" sz="1200" b="0" dirty="0" err="1">
+                          <a:solidFill>
+                            <a:schemeClr val="tx1"/>
+                          </a:solidFill>
+                          <a:effectLst/>
+                        </a:rPr>
+                        <a:t>password_hash</a:t>
+                      </a:r>
+                      <a:endParaRPr lang="en-US" sz="1100" b="0" dirty="0">
+                        <a:solidFill>
+                          <a:schemeClr val="tx1"/>
+                        </a:solidFill>
+                        <a:effectLst/>
+                        <a:latin typeface="Calibri" panose="020F0502020204030204" pitchFamily="34" charset="0"/>
+                        <a:ea typeface="Calibri" panose="020F0502020204030204" pitchFamily="34" charset="0"/>
+                        <a:cs typeface="Times New Roman" panose="02020603050405020304" pitchFamily="18" charset="0"/>
+                      </a:endParaRPr>
+                    </a:p>
+                  </a:txBody>
+                  <a:tcPr marL="66466" marR="66466" marT="0" marB="0">
+                    <a:lnL w="12700" cap="flat" cmpd="sng" algn="ctr">
+                      <a:solidFill>
+                        <a:schemeClr val="tx1"/>
+                      </a:solidFill>
+                      <a:prstDash val="solid"/>
+                      <a:round/>
+                      <a:headEnd type="none" w="med" len="med"/>
+                      <a:tailEnd type="none" w="med" len="med"/>
+                    </a:lnL>
+                    <a:lnR w="12700" cap="flat" cmpd="sng" algn="ctr">
+                      <a:solidFill>
+                        <a:schemeClr val="tx1"/>
+                      </a:solidFill>
+                      <a:prstDash val="solid"/>
+                      <a:round/>
+                      <a:headEnd type="none" w="med" len="med"/>
+                      <a:tailEnd type="none" w="med" len="med"/>
+                    </a:lnR>
+                    <a:lnT w="12700" cap="flat" cmpd="sng" algn="ctr">
+                      <a:solidFill>
+                        <a:schemeClr val="tx1"/>
+                      </a:solidFill>
+                      <a:prstDash val="solid"/>
+                      <a:round/>
+                      <a:headEnd type="none" w="med" len="med"/>
+                      <a:tailEnd type="none" w="med" len="med"/>
+                    </a:lnT>
+                    <a:lnB w="12700" cap="flat" cmpd="sng" algn="ctr">
+                      <a:solidFill>
+                        <a:schemeClr val="tx1"/>
+                      </a:solidFill>
+                      <a:prstDash val="solid"/>
+                      <a:round/>
+                      <a:headEnd type="none" w="med" len="med"/>
+                      <a:tailEnd type="none" w="med" len="med"/>
+                    </a:lnB>
+                    <a:solidFill>
+                      <a:schemeClr val="bg1">
+                        <a:lumMod val="85000"/>
+                      </a:schemeClr>
+                    </a:solidFill>
+                  </a:tcPr>
+                </a:tc>
+                <a:extLst>
+                  <a:ext uri="{0D108BD9-81ED-4DB2-BD59-A6C34878D82A}">
+                    <a16:rowId xmlns:a16="http://schemas.microsoft.com/office/drawing/2014/main" val="987908453"/>
+                  </a:ext>
+                </a:extLst>
+              </a:tr>
+            </a:tbl>
+          </a:graphicData>
+        </a:graphic>
+      </p:graphicFrame>
+      <p:graphicFrame>
+        <p:nvGraphicFramePr>
+          <p:cNvPr id="42" name="Table 41">
+            <a:extLst>
+              <a:ext uri="{FF2B5EF4-FFF2-40B4-BE49-F238E27FC236}">
+                <a16:creationId xmlns:a16="http://schemas.microsoft.com/office/drawing/2014/main" id="{D44F5972-BE17-425F-B567-5F4DFBC33116}"/>
+              </a:ext>
+            </a:extLst>
+          </p:cNvPr>
+          <p:cNvGraphicFramePr>
+            <a:graphicFrameLocks noGrp="1"/>
+          </p:cNvGraphicFramePr>
+          <p:nvPr>
+            <p:extLst>
+              <p:ext uri="{D42A27DB-BD31-4B8C-83A1-F6EECF244321}">
+                <p14:modId xmlns:p14="http://schemas.microsoft.com/office/powerpoint/2010/main" val="572861046"/>
+              </p:ext>
+            </p:extLst>
+          </p:nvPr>
+        </p:nvGraphicFramePr>
+        <p:xfrm>
+          <a:off x="4012292" y="112908"/>
+          <a:ext cx="1329329" cy="561213"/>
+        </p:xfrm>
+        <a:graphic>
+          <a:graphicData uri="http://schemas.openxmlformats.org/drawingml/2006/table">
+            <a:tbl>
+              <a:tblPr firstRow="1" firstCol="1" bandRow="1">
+                <a:tableStyleId>{5C22544A-7EE6-4342-B048-85BDC9FD1C3A}</a:tableStyleId>
+              </a:tblPr>
+              <a:tblGrid>
+                <a:gridCol w="1329329">
+                  <a:extLst>
+                    <a:ext uri="{9D8B030D-6E8A-4147-A177-3AD203B41FA5}">
+                      <a16:colId xmlns:a16="http://schemas.microsoft.com/office/drawing/2014/main" val="367853106"/>
+                    </a:ext>
+                  </a:extLst>
+                </a:gridCol>
+              </a:tblGrid>
+              <a:tr h="181306">
+                <a:tc>
+                  <a:txBody>
+                    <a:bodyPr/>
+                    <a:lstStyle/>
+                    <a:p>
+                      <a:pPr marL="0" marR="0" algn="ctr">
+                        <a:lnSpc>
+                          <a:spcPct val="107000"/>
+                        </a:lnSpc>
+                        <a:spcBef>
+                          <a:spcPts val="0"/>
+                        </a:spcBef>
+                        <a:spcAft>
+                          <a:spcPts val="0"/>
+                        </a:spcAft>
+                      </a:pPr>
+                      <a:r>
+                        <a:rPr lang="en-US" sz="1200" dirty="0">
+                          <a:solidFill>
+                            <a:schemeClr val="tx1"/>
+                          </a:solidFill>
+                          <a:effectLst/>
+                          <a:latin typeface="Calibri" panose="020F0502020204030204" pitchFamily="34" charset="0"/>
+                          <a:ea typeface="Calibri" panose="020F0502020204030204" pitchFamily="34" charset="0"/>
+                          <a:cs typeface="Times New Roman" panose="02020603050405020304" pitchFamily="18" charset="0"/>
+                        </a:rPr>
+                        <a:t>Favorites</a:t>
+                      </a:r>
+                      <a:endParaRPr lang="en-US" sz="1100" dirty="0">
+                        <a:solidFill>
+                          <a:schemeClr val="tx1"/>
+                        </a:solidFill>
+                        <a:effectLst/>
+                        <a:latin typeface="Calibri" panose="020F0502020204030204" pitchFamily="34" charset="0"/>
+                        <a:ea typeface="Calibri" panose="020F0502020204030204" pitchFamily="34" charset="0"/>
+                        <a:cs typeface="Times New Roman" panose="02020603050405020304" pitchFamily="18" charset="0"/>
+                      </a:endParaRPr>
+                    </a:p>
+                  </a:txBody>
+                  <a:tcPr marL="66466" marR="66466" marT="0" marB="0">
+                    <a:lnL w="12700" cap="flat" cmpd="sng" algn="ctr">
+                      <a:solidFill>
+                        <a:schemeClr val="tx1"/>
+                      </a:solidFill>
+                      <a:prstDash val="solid"/>
+                      <a:round/>
+                      <a:headEnd type="none" w="med" len="med"/>
+                      <a:tailEnd type="none" w="med" len="med"/>
+                    </a:lnL>
+                    <a:lnR w="12700" cap="flat" cmpd="sng" algn="ctr">
+                      <a:solidFill>
+                        <a:schemeClr val="tx1"/>
+                      </a:solidFill>
+                      <a:prstDash val="solid"/>
+                      <a:round/>
+                      <a:headEnd type="none" w="med" len="med"/>
+                      <a:tailEnd type="none" w="med" len="med"/>
+                    </a:lnR>
+                    <a:lnT w="12700" cap="flat" cmpd="sng" algn="ctr">
+                      <a:solidFill>
+                        <a:schemeClr val="tx1"/>
+                      </a:solidFill>
+                      <a:prstDash val="solid"/>
+                      <a:round/>
+                      <a:headEnd type="none" w="med" len="med"/>
+                      <a:tailEnd type="none" w="med" len="med"/>
+                    </a:lnT>
+                    <a:lnB w="12700" cap="flat" cmpd="sng" algn="ctr">
+                      <a:solidFill>
+                        <a:schemeClr val="tx1"/>
+                      </a:solidFill>
+                      <a:prstDash val="solid"/>
+                      <a:round/>
+                      <a:headEnd type="none" w="med" len="med"/>
+                      <a:tailEnd type="none" w="med" len="med"/>
+                    </a:lnB>
+                    <a:solidFill>
+                      <a:schemeClr val="bg1">
+                        <a:lumMod val="85000"/>
+                      </a:schemeClr>
+                    </a:solidFill>
+                  </a:tcPr>
+                </a:tc>
+                <a:extLst>
+                  <a:ext uri="{0D108BD9-81ED-4DB2-BD59-A6C34878D82A}">
+                    <a16:rowId xmlns:a16="http://schemas.microsoft.com/office/drawing/2014/main" val="1416855876"/>
+                  </a:ext>
+                </a:extLst>
+              </a:tr>
+              <a:tr h="181306">
+                <a:tc>
+                  <a:txBody>
+                    <a:bodyPr/>
+                    <a:lstStyle/>
+                    <a:p>
+                      <a:pPr marL="40005" marR="0" algn="ctr">
+                        <a:lnSpc>
+                          <a:spcPct val="107000"/>
+                        </a:lnSpc>
+                        <a:spcBef>
+                          <a:spcPts val="0"/>
+                        </a:spcBef>
+                        <a:spcAft>
+                          <a:spcPts val="0"/>
+                        </a:spcAft>
+                      </a:pPr>
+                      <a:r>
+                        <a:rPr lang="en-US" sz="1200" b="0" u="sng" dirty="0" err="1">
+                          <a:solidFill>
+                            <a:schemeClr val="tx1"/>
+                          </a:solidFill>
+                          <a:effectLst/>
+                        </a:rPr>
+                        <a:t>userID</a:t>
+                      </a:r>
+                      <a:endParaRPr lang="en-US" sz="1100" b="0" u="sng" dirty="0">
+                        <a:solidFill>
+                          <a:schemeClr val="tx1"/>
+                        </a:solidFill>
+                        <a:effectLst/>
+                        <a:latin typeface="Calibri" panose="020F0502020204030204" pitchFamily="34" charset="0"/>
+                        <a:ea typeface="Calibri" panose="020F0502020204030204" pitchFamily="34" charset="0"/>
+                        <a:cs typeface="Times New Roman" panose="02020603050405020304" pitchFamily="18" charset="0"/>
+                      </a:endParaRPr>
+                    </a:p>
+                  </a:txBody>
+                  <a:tcPr marL="66466" marR="66466" marT="0" marB="0">
+                    <a:lnL w="12700" cap="flat" cmpd="sng" algn="ctr">
+                      <a:solidFill>
+                        <a:schemeClr val="tx1"/>
+                      </a:solidFill>
+                      <a:prstDash val="solid"/>
+                      <a:round/>
+                      <a:headEnd type="none" w="med" len="med"/>
+                      <a:tailEnd type="none" w="med" len="med"/>
+                    </a:lnL>
+                    <a:lnR w="12700" cap="flat" cmpd="sng" algn="ctr">
+                      <a:solidFill>
+                        <a:schemeClr val="tx1"/>
+                      </a:solidFill>
+                      <a:prstDash val="solid"/>
+                      <a:round/>
+                      <a:headEnd type="none" w="med" len="med"/>
+                      <a:tailEnd type="none" w="med" len="med"/>
+                    </a:lnR>
+                    <a:lnT w="12700" cap="flat" cmpd="sng" algn="ctr">
+                      <a:solidFill>
+                        <a:schemeClr val="tx1"/>
+                      </a:solidFill>
+                      <a:prstDash val="solid"/>
+                      <a:round/>
+                      <a:headEnd type="none" w="med" len="med"/>
+                      <a:tailEnd type="none" w="med" len="med"/>
+                    </a:lnT>
+                    <a:lnB w="12700" cap="flat" cmpd="sng" algn="ctr">
+                      <a:solidFill>
+                        <a:schemeClr val="tx1"/>
+                      </a:solidFill>
+                      <a:prstDash val="solid"/>
+                      <a:round/>
+                      <a:headEnd type="none" w="med" len="med"/>
+                      <a:tailEnd type="none" w="med" len="med"/>
+                    </a:lnB>
+                    <a:solidFill>
+                      <a:schemeClr val="bg1">
+                        <a:lumMod val="85000"/>
+                      </a:schemeClr>
+                    </a:solidFill>
+                  </a:tcPr>
+                </a:tc>
+                <a:extLst>
+                  <a:ext uri="{0D108BD9-81ED-4DB2-BD59-A6C34878D82A}">
+                    <a16:rowId xmlns:a16="http://schemas.microsoft.com/office/drawing/2014/main" val="3461335968"/>
+                  </a:ext>
+                </a:extLst>
+              </a:tr>
+              <a:tr h="181306">
+                <a:tc>
+                  <a:txBody>
+                    <a:bodyPr/>
+                    <a:lstStyle/>
+                    <a:p>
+                      <a:pPr marL="0" marR="0" algn="ctr">
+                        <a:lnSpc>
+                          <a:spcPct val="107000"/>
+                        </a:lnSpc>
+                        <a:spcBef>
+                          <a:spcPts val="0"/>
+                        </a:spcBef>
+                        <a:spcAft>
+                          <a:spcPts val="0"/>
+                        </a:spcAft>
+                      </a:pPr>
+                      <a:r>
+                        <a:rPr lang="en-US" sz="1200" b="0" u="sng" dirty="0">
+                          <a:solidFill>
+                            <a:schemeClr val="tx1"/>
+                          </a:solidFill>
+                          <a:effectLst/>
+                        </a:rPr>
+                        <a:t>playerID</a:t>
+                      </a:r>
+                      <a:endParaRPr lang="en-US" sz="1100" b="0" u="sng" dirty="0">
+                        <a:solidFill>
+                          <a:schemeClr val="tx1"/>
+                        </a:solidFill>
+                        <a:effectLst/>
+                        <a:latin typeface="Calibri" panose="020F0502020204030204" pitchFamily="34" charset="0"/>
+                        <a:ea typeface="Calibri" panose="020F0502020204030204" pitchFamily="34" charset="0"/>
+                        <a:cs typeface="Times New Roman" panose="02020603050405020304" pitchFamily="18" charset="0"/>
+                      </a:endParaRPr>
+                    </a:p>
+                  </a:txBody>
+                  <a:tcPr marL="66466" marR="66466" marT="0" marB="0">
+                    <a:lnL w="12700" cap="flat" cmpd="sng" algn="ctr">
+                      <a:solidFill>
+                        <a:schemeClr val="tx1"/>
+                      </a:solidFill>
+                      <a:prstDash val="solid"/>
+                      <a:round/>
+                      <a:headEnd type="none" w="med" len="med"/>
+                      <a:tailEnd type="none" w="med" len="med"/>
+                    </a:lnL>
+                    <a:lnR w="12700" cap="flat" cmpd="sng" algn="ctr">
+                      <a:solidFill>
+                        <a:schemeClr val="tx1"/>
+                      </a:solidFill>
+                      <a:prstDash val="solid"/>
+                      <a:round/>
+                      <a:headEnd type="none" w="med" len="med"/>
+                      <a:tailEnd type="none" w="med" len="med"/>
+                    </a:lnR>
+                    <a:lnT w="12700" cap="flat" cmpd="sng" algn="ctr">
+                      <a:solidFill>
+                        <a:schemeClr val="tx1"/>
+                      </a:solidFill>
+                      <a:prstDash val="solid"/>
+                      <a:round/>
+                      <a:headEnd type="none" w="med" len="med"/>
+                      <a:tailEnd type="none" w="med" len="med"/>
+                    </a:lnT>
+                    <a:lnB w="12700" cap="flat" cmpd="sng" algn="ctr">
+                      <a:solidFill>
+                        <a:schemeClr val="tx1"/>
+                      </a:solidFill>
+                      <a:prstDash val="solid"/>
+                      <a:round/>
+                      <a:headEnd type="none" w="med" len="med"/>
+                      <a:tailEnd type="none" w="med" len="med"/>
+                    </a:lnB>
+                    <a:solidFill>
+                      <a:schemeClr val="bg1">
+                        <a:lumMod val="85000"/>
+                      </a:schemeClr>
+                    </a:solidFill>
+                  </a:tcPr>
+                </a:tc>
+                <a:extLst>
+                  <a:ext uri="{0D108BD9-81ED-4DB2-BD59-A6C34878D82A}">
+                    <a16:rowId xmlns:a16="http://schemas.microsoft.com/office/drawing/2014/main" val="269878394"/>
+                  </a:ext>
+                </a:extLst>
+              </a:tr>
+            </a:tbl>
+          </a:graphicData>
+        </a:graphic>
+      </p:graphicFrame>
     </p:spTree>
     <p:extLst>
       <p:ext uri="{BB962C8B-B14F-4D97-AF65-F5344CB8AC3E}">
@@ -4171,7 +5232,7 @@
 </p:sld>
 </file>
 
-<file path=ppt/slides/slide2.xml><?xml version="1.0" encoding="utf-8"?>
+<file path=ppt/slides/slide3.xml><?xml version="1.0" encoding="utf-8"?>
 <p:sld xmlns:a="http://schemas.openxmlformats.org/drawingml/2006/main" xmlns:r="http://schemas.openxmlformats.org/officeDocument/2006/relationships" xmlns:p="http://schemas.openxmlformats.org/presentationml/2006/main">
   <p:cSld>
     <p:spTree>
@@ -4988,7 +6049,7 @@
 </p:sld>
 </file>
 
-<file path=ppt/slides/slide3.xml><?xml version="1.0" encoding="utf-8"?>
+<file path=ppt/slides/slide4.xml><?xml version="1.0" encoding="utf-8"?>
 <p:sld xmlns:a="http://schemas.openxmlformats.org/drawingml/2006/main" xmlns:r="http://schemas.openxmlformats.org/officeDocument/2006/relationships" xmlns:p="http://schemas.openxmlformats.org/presentationml/2006/main">
   <p:cSld>
     <p:spTree>
@@ -15205,7 +16266,7 @@
 </p:sld>
 </file>
 
-<file path=ppt/slides/slide4.xml><?xml version="1.0" encoding="utf-8"?>
+<file path=ppt/slides/slide5.xml><?xml version="1.0" encoding="utf-8"?>
 <p:sld xmlns:a="http://schemas.openxmlformats.org/drawingml/2006/main" xmlns:r="http://schemas.openxmlformats.org/officeDocument/2006/relationships" xmlns:p="http://schemas.openxmlformats.org/presentationml/2006/main">
   <p:cSld>
     <p:spTree>
@@ -15856,7 +16917,7 @@
 </p:sld>
 </file>
 
-<file path=ppt/slides/slide5.xml><?xml version="1.0" encoding="utf-8"?>
+<file path=ppt/slides/slide6.xml><?xml version="1.0" encoding="utf-8"?>
 <p:sld xmlns:a="http://schemas.openxmlformats.org/drawingml/2006/main" xmlns:r="http://schemas.openxmlformats.org/officeDocument/2006/relationships" xmlns:p="http://schemas.openxmlformats.org/presentationml/2006/main">
   <p:cSld>
     <p:spTree>
@@ -19759,7 +20820,7 @@
                         </a:spcAft>
                       </a:pPr>
                       <a:r>
-                        <a:rPr lang="en-US" sz="1200" b="0">
+                        <a:rPr lang="en-US" sz="1200" b="0" dirty="0">
                           <a:solidFill>
                             <a:schemeClr val="tx1"/>
                           </a:solidFill>
@@ -19767,7 +20828,7 @@
                         </a:rPr>
                         <a:t>HBP</a:t>
                       </a:r>
-                      <a:endParaRPr lang="en-US" sz="1100" b="0">
+                      <a:endParaRPr lang="en-US" sz="1100" b="0" dirty="0">
                         <a:solidFill>
                           <a:schemeClr val="tx1"/>
                         </a:solidFill>
@@ -19846,7 +20907,7 @@
                         </a:spcAft>
                       </a:pPr>
                       <a:r>
-                        <a:rPr lang="en-US" sz="1200" b="0">
+                        <a:rPr lang="en-US" sz="1200" b="0" dirty="0">
                           <a:solidFill>
                             <a:schemeClr val="tx1"/>
                           </a:solidFill>
@@ -19854,7 +20915,7 @@
                         </a:rPr>
                         <a:t>SH</a:t>
                       </a:r>
-                      <a:endParaRPr lang="en-US" sz="1100" b="0">
+                      <a:endParaRPr lang="en-US" sz="1100" b="0" dirty="0">
                         <a:solidFill>
                           <a:schemeClr val="tx1"/>
                         </a:solidFill>
@@ -19933,7 +20994,7 @@
                         </a:spcAft>
                       </a:pPr>
                       <a:r>
-                        <a:rPr lang="en-US" sz="1200" b="0">
+                        <a:rPr lang="en-US" sz="1200" b="0" dirty="0">
                           <a:solidFill>
                             <a:schemeClr val="tx1"/>
                           </a:solidFill>
@@ -19941,7 +21002,7 @@
                         </a:rPr>
                         <a:t>SF</a:t>
                       </a:r>
-                      <a:endParaRPr lang="en-US" sz="1100" b="0">
+                      <a:endParaRPr lang="en-US" sz="1100" b="0" dirty="0">
                         <a:solidFill>
                           <a:schemeClr val="tx1"/>
                         </a:solidFill>

</xml_diff>